<commit_message>
added formulas to electric
</commit_message>
<xml_diff>
--- a/electric/electric.pptx
+++ b/electric/electric.pptx
@@ -3357,47 +3357,8 @@
         </p:blipFill>
         <p:spPr>
           <a:xfrm>
-            <a:off x="3040156" y="1984598"/>
-            <a:ext cx="1121088" cy="1017765"/>
-          </a:xfrm>
-          <a:prstGeom prst="rect">
-            <a:avLst/>
-          </a:prstGeom>
-        </p:spPr>
-      </p:pic>
-      <p:pic>
-        <p:nvPicPr>
-          <p:cNvPr id="36" name="Picture 35" descr="A close up of a device&#10;&#10;Description automatically generated">
-            <a:extLst>
-              <a:ext uri="{FF2B5EF4-FFF2-40B4-BE49-F238E27FC236}">
-                <a16:creationId xmlns:a16="http://schemas.microsoft.com/office/drawing/2014/main" id="{8209B1B3-5E0A-4AAB-8A18-E270C9942326}"/>
-              </a:ext>
-            </a:extLst>
-          </p:cNvPr>
-          <p:cNvPicPr>
-            <a:picLocks noChangeAspect="1"/>
-          </p:cNvPicPr>
-          <p:nvPr/>
-        </p:nvPicPr>
-        <p:blipFill>
-          <a:blip r:embed="rId2">
-            <a:extLst>
-              <a:ext uri="{28A0092B-C50C-407E-A947-70E740481C1C}">
-                <a14:useLocalDpi xmlns:a14="http://schemas.microsoft.com/office/drawing/2010/main" val="0"/>
-              </a:ext>
-              <a:ext uri="{837473B0-CC2E-450A-ABE3-18F120FF3D39}">
-                <a1611:picAttrSrcUrl xmlns:a1611="http://schemas.microsoft.com/office/drawing/2016/11/main" r:id="rId3"/>
-              </a:ext>
-            </a:extLst>
-          </a:blip>
-          <a:stretch>
-            <a:fillRect/>
-          </a:stretch>
-        </p:blipFill>
-        <p:spPr>
-          <a:xfrm>
-            <a:off x="3808281" y="1675435"/>
-            <a:ext cx="1121088" cy="1017765"/>
+            <a:off x="3121554" y="2053431"/>
+            <a:ext cx="1071773" cy="972995"/>
           </a:xfrm>
           <a:prstGeom prst="rect">
             <a:avLst/>
@@ -3655,10 +3616,10 @@
       </p:cxnSp>
       <p:cxnSp>
         <p:nvCxnSpPr>
-          <p:cNvPr id="29" name="Straight Connector 28">
-            <a:extLst>
-              <a:ext uri="{FF2B5EF4-FFF2-40B4-BE49-F238E27FC236}">
-                <a16:creationId xmlns:a16="http://schemas.microsoft.com/office/drawing/2014/main" id="{FCCA5911-989C-45AB-9D7A-8066AB624751}"/>
+          <p:cNvPr id="33" name="Straight Connector 32">
+            <a:extLst>
+              <a:ext uri="{FF2B5EF4-FFF2-40B4-BE49-F238E27FC236}">
+                <a16:creationId xmlns:a16="http://schemas.microsoft.com/office/drawing/2014/main" id="{0D1C482F-4775-4B69-A024-8E8458C8CB63}"/>
               </a:ext>
             </a:extLst>
           </p:cNvPr>
@@ -3669,8 +3630,8 @@
         </p:nvCxnSpPr>
         <p:spPr>
           <a:xfrm>
-            <a:off x="4457700" y="2602303"/>
-            <a:ext cx="1724473" cy="9004"/>
+            <a:off x="3797320" y="2915831"/>
+            <a:ext cx="2280078" cy="38376"/>
           </a:xfrm>
           <a:prstGeom prst="line">
             <a:avLst/>
@@ -3700,51 +3661,6 @@
       </p:cxnSp>
       <p:cxnSp>
         <p:nvCxnSpPr>
-          <p:cNvPr id="33" name="Straight Connector 32">
-            <a:extLst>
-              <a:ext uri="{FF2B5EF4-FFF2-40B4-BE49-F238E27FC236}">
-                <a16:creationId xmlns:a16="http://schemas.microsoft.com/office/drawing/2014/main" id="{0D1C482F-4775-4B69-A024-8E8458C8CB63}"/>
-              </a:ext>
-            </a:extLst>
-          </p:cNvPr>
-          <p:cNvCxnSpPr>
-            <a:cxnSpLocks/>
-          </p:cNvCxnSpPr>
-          <p:nvPr/>
-        </p:nvCxnSpPr>
-        <p:spPr>
-          <a:xfrm>
-            <a:off x="3733800" y="2921481"/>
-            <a:ext cx="2343598" cy="32726"/>
-          </a:xfrm>
-          <a:prstGeom prst="line">
-            <a:avLst/>
-          </a:prstGeom>
-          <a:ln w="44450">
-            <a:solidFill>
-              <a:schemeClr val="accent2">
-                <a:lumMod val="75000"/>
-              </a:schemeClr>
-            </a:solidFill>
-          </a:ln>
-        </p:spPr>
-        <p:style>
-          <a:lnRef idx="1">
-            <a:schemeClr val="accent1"/>
-          </a:lnRef>
-          <a:fillRef idx="0">
-            <a:schemeClr val="accent1"/>
-          </a:fillRef>
-          <a:effectRef idx="0">
-            <a:schemeClr val="accent1"/>
-          </a:effectRef>
-          <a:fontRef idx="minor">
-            <a:schemeClr val="tx1"/>
-          </a:fontRef>
-        </p:style>
-      </p:cxnSp>
-      <p:cxnSp>
-        <p:nvCxnSpPr>
           <p:cNvPr id="35" name="Straight Connector 34">
             <a:extLst>
               <a:ext uri="{FF2B5EF4-FFF2-40B4-BE49-F238E27FC236}">
@@ -3804,7 +3720,7 @@
         </p:nvCxnSpPr>
         <p:spPr>
           <a:xfrm>
-            <a:off x="3611364" y="2892826"/>
+            <a:off x="3635427" y="2892826"/>
             <a:ext cx="0" cy="888599"/>
           </a:xfrm>
           <a:prstGeom prst="line">
@@ -3849,8 +3765,8 @@
         </p:nvCxnSpPr>
         <p:spPr>
           <a:xfrm>
-            <a:off x="3592314" y="3797701"/>
-            <a:ext cx="627261" cy="0"/>
+            <a:off x="3616378" y="3788176"/>
+            <a:ext cx="603197" cy="9525"/>
           </a:xfrm>
           <a:prstGeom prst="line">
             <a:avLst/>
@@ -3881,51 +3797,6 @@
       </p:cxnSp>
       <p:cxnSp>
         <p:nvCxnSpPr>
-          <p:cNvPr id="43" name="Straight Connector 42">
-            <a:extLst>
-              <a:ext uri="{FF2B5EF4-FFF2-40B4-BE49-F238E27FC236}">
-                <a16:creationId xmlns:a16="http://schemas.microsoft.com/office/drawing/2014/main" id="{C2C56125-3B9A-4364-B928-5A86F294E9C4}"/>
-              </a:ext>
-            </a:extLst>
-          </p:cNvPr>
-          <p:cNvCxnSpPr>
-            <a:cxnSpLocks/>
-          </p:cNvCxnSpPr>
-          <p:nvPr/>
-        </p:nvCxnSpPr>
-        <p:spPr>
-          <a:xfrm>
-            <a:off x="4363839" y="2559451"/>
-            <a:ext cx="0" cy="1249421"/>
-          </a:xfrm>
-          <a:prstGeom prst="line">
-            <a:avLst/>
-          </a:prstGeom>
-          <a:ln w="44450">
-            <a:solidFill>
-              <a:schemeClr val="accent6">
-                <a:lumMod val="75000"/>
-              </a:schemeClr>
-            </a:solidFill>
-          </a:ln>
-        </p:spPr>
-        <p:style>
-          <a:lnRef idx="1">
-            <a:schemeClr val="accent1"/>
-          </a:lnRef>
-          <a:fillRef idx="0">
-            <a:schemeClr val="accent1"/>
-          </a:fillRef>
-          <a:effectRef idx="0">
-            <a:schemeClr val="accent1"/>
-          </a:effectRef>
-          <a:fontRef idx="minor">
-            <a:schemeClr val="tx1"/>
-          </a:fontRef>
-        </p:style>
-      </p:cxnSp>
-      <p:cxnSp>
-        <p:nvCxnSpPr>
           <p:cNvPr id="46" name="Straight Connector 45">
             <a:extLst>
               <a:ext uri="{FF2B5EF4-FFF2-40B4-BE49-F238E27FC236}">
@@ -4657,6 +4528,135 @@
           </a:p>
         </p:txBody>
       </p:sp>
+      <p:pic>
+        <p:nvPicPr>
+          <p:cNvPr id="36" name="Picture 35" descr="A close up of a device&#10;&#10;Description automatically generated">
+            <a:extLst>
+              <a:ext uri="{FF2B5EF4-FFF2-40B4-BE49-F238E27FC236}">
+                <a16:creationId xmlns:a16="http://schemas.microsoft.com/office/drawing/2014/main" id="{8209B1B3-5E0A-4AAB-8A18-E270C9942326}"/>
+              </a:ext>
+            </a:extLst>
+          </p:cNvPr>
+          <p:cNvPicPr>
+            <a:picLocks noChangeAspect="1"/>
+          </p:cNvPicPr>
+          <p:nvPr/>
+        </p:nvPicPr>
+        <p:blipFill>
+          <a:blip r:embed="rId2">
+            <a:extLst>
+              <a:ext uri="{28A0092B-C50C-407E-A947-70E740481C1C}">
+                <a14:useLocalDpi xmlns:a14="http://schemas.microsoft.com/office/drawing/2010/main" val="0"/>
+              </a:ext>
+              <a:ext uri="{837473B0-CC2E-450A-ABE3-18F120FF3D39}">
+                <a1611:picAttrSrcUrl xmlns:a1611="http://schemas.microsoft.com/office/drawing/2016/11/main" r:id="rId3"/>
+              </a:ext>
+            </a:extLst>
+          </a:blip>
+          <a:stretch>
+            <a:fillRect/>
+          </a:stretch>
+        </p:blipFill>
+        <p:spPr>
+          <a:xfrm>
+            <a:off x="3857673" y="1749307"/>
+            <a:ext cx="1030881" cy="935872"/>
+          </a:xfrm>
+          <a:prstGeom prst="rect">
+            <a:avLst/>
+          </a:prstGeom>
+        </p:spPr>
+      </p:pic>
+      <p:cxnSp>
+        <p:nvCxnSpPr>
+          <p:cNvPr id="29" name="Straight Connector 28">
+            <a:extLst>
+              <a:ext uri="{FF2B5EF4-FFF2-40B4-BE49-F238E27FC236}">
+                <a16:creationId xmlns:a16="http://schemas.microsoft.com/office/drawing/2014/main" id="{FCCA5911-989C-45AB-9D7A-8066AB624751}"/>
+              </a:ext>
+            </a:extLst>
+          </p:cNvPr>
+          <p:cNvCxnSpPr>
+            <a:cxnSpLocks/>
+          </p:cNvCxnSpPr>
+          <p:nvPr/>
+        </p:nvCxnSpPr>
+        <p:spPr>
+          <a:xfrm>
+            <a:off x="4485899" y="2599667"/>
+            <a:ext cx="1696274" cy="11640"/>
+          </a:xfrm>
+          <a:prstGeom prst="line">
+            <a:avLst/>
+          </a:prstGeom>
+          <a:ln w="44450">
+            <a:solidFill>
+              <a:schemeClr val="accent2">
+                <a:lumMod val="75000"/>
+              </a:schemeClr>
+            </a:solidFill>
+          </a:ln>
+        </p:spPr>
+        <p:style>
+          <a:lnRef idx="1">
+            <a:schemeClr val="accent1"/>
+          </a:lnRef>
+          <a:fillRef idx="0">
+            <a:schemeClr val="accent1"/>
+          </a:fillRef>
+          <a:effectRef idx="0">
+            <a:schemeClr val="accent1"/>
+          </a:effectRef>
+          <a:fontRef idx="minor">
+            <a:schemeClr val="tx1"/>
+          </a:fontRef>
+        </p:style>
+      </p:cxnSp>
+      <p:cxnSp>
+        <p:nvCxnSpPr>
+          <p:cNvPr id="43" name="Straight Connector 42">
+            <a:extLst>
+              <a:ext uri="{FF2B5EF4-FFF2-40B4-BE49-F238E27FC236}">
+                <a16:creationId xmlns:a16="http://schemas.microsoft.com/office/drawing/2014/main" id="{C2C56125-3B9A-4364-B928-5A86F294E9C4}"/>
+              </a:ext>
+            </a:extLst>
+          </p:cNvPr>
+          <p:cNvCxnSpPr>
+            <a:cxnSpLocks/>
+          </p:cNvCxnSpPr>
+          <p:nvPr/>
+        </p:nvCxnSpPr>
+        <p:spPr>
+          <a:xfrm>
+            <a:off x="4379881" y="2559451"/>
+            <a:ext cx="0" cy="1249421"/>
+          </a:xfrm>
+          <a:prstGeom prst="line">
+            <a:avLst/>
+          </a:prstGeom>
+          <a:ln w="44450">
+            <a:solidFill>
+              <a:schemeClr val="accent6">
+                <a:lumMod val="75000"/>
+              </a:schemeClr>
+            </a:solidFill>
+          </a:ln>
+        </p:spPr>
+        <p:style>
+          <a:lnRef idx="1">
+            <a:schemeClr val="accent1"/>
+          </a:lnRef>
+          <a:fillRef idx="0">
+            <a:schemeClr val="accent1"/>
+          </a:fillRef>
+          <a:effectRef idx="0">
+            <a:schemeClr val="accent1"/>
+          </a:effectRef>
+          <a:fontRef idx="minor">
+            <a:schemeClr val="tx1"/>
+          </a:fontRef>
+        </p:style>
+      </p:cxnSp>
     </p:spTree>
     <p:extLst>
       <p:ext uri="{BB962C8B-B14F-4D97-AF65-F5344CB8AC3E}">

</xml_diff>